<commit_message>
Updated draft final presentation slides
</commit_message>
<xml_diff>
--- a/pre3.pptx
+++ b/pre3.pptx
@@ -5,7 +5,7 @@
     <p:sldMasterId id="2147484740" r:id="rId1"/>
   </p:sldMasterIdLst>
   <p:notesMasterIdLst>
-    <p:notesMasterId r:id="rId12"/>
+    <p:notesMasterId r:id="rId16"/>
   </p:notesMasterIdLst>
   <p:sldIdLst>
     <p:sldId id="256" r:id="rId2"/>
@@ -17,7 +17,11 @@
     <p:sldId id="266" r:id="rId8"/>
     <p:sldId id="267" r:id="rId9"/>
     <p:sldId id="260" r:id="rId10"/>
-    <p:sldId id="268" r:id="rId11"/>
+    <p:sldId id="269" r:id="rId11"/>
+    <p:sldId id="270" r:id="rId12"/>
+    <p:sldId id="271" r:id="rId13"/>
+    <p:sldId id="272" r:id="rId14"/>
+    <p:sldId id="273" r:id="rId15"/>
   </p:sldIdLst>
   <p:sldSz cx="9144000" cy="6858000" type="screen4x3"/>
   <p:notesSz cx="6858000" cy="9144000"/>
@@ -118,7 +122,7 @@
   </p:defaultTextStyle>
   <p:extLst>
     <p:ext uri="{EFAFB233-063F-42B5-8137-9DF3F51BA10A}">
-      <p15:sldGuideLst xmlns:p15="http://schemas.microsoft.com/office/powerpoint/2012/main" xmlns="">
+      <p15:sldGuideLst xmlns="" xmlns:p15="http://schemas.microsoft.com/office/powerpoint/2012/main">
         <p15:guide id="1" orient="horz" pos="2160">
           <p15:clr>
             <a:srgbClr val="A4A3A4"/>
@@ -9905,6 +9909,1798 @@
       </p:grpSpPr>
       <p:sp>
         <p:nvSpPr>
+          <p:cNvPr id="2" name="Title 1"/>
+          <p:cNvSpPr>
+            <a:spLocks noGrp="1"/>
+          </p:cNvSpPr>
+          <p:nvPr>
+            <p:ph type="title"/>
+          </p:nvPr>
+        </p:nvSpPr>
+        <p:spPr/>
+        <p:txBody>
+          <a:bodyPr/>
+          <a:lstStyle/>
+          <a:p>
+            <a:r>
+              <a:rPr lang="en-US" altLang="zh-CN" dirty="0">
+                <a:effectLst>
+                  <a:outerShdw blurRad="38100" dist="38100" dir="2700000" algn="tl">
+                    <a:srgbClr val="212121"/>
+                  </a:outerShdw>
+                </a:effectLst>
+                <a:latin typeface="Times New Roman"/>
+                <a:cs typeface="Times New Roman"/>
+              </a:rPr>
+              <a:t>Putting Work on CHTC</a:t>
+            </a:r>
+          </a:p>
+        </p:txBody>
+      </p:sp>
+      <p:sp>
+        <p:nvSpPr>
+          <p:cNvPr id="3" name="Content Placeholder 2"/>
+          <p:cNvSpPr>
+            <a:spLocks noGrp="1"/>
+          </p:cNvSpPr>
+          <p:nvPr>
+            <p:ph idx="1"/>
+          </p:nvPr>
+        </p:nvSpPr>
+        <p:spPr>
+          <a:xfrm>
+            <a:off x="685800" y="1868488"/>
+            <a:ext cx="7770813" cy="4257675"/>
+          </a:xfrm>
+        </p:spPr>
+        <p:txBody>
+          <a:bodyPr/>
+          <a:lstStyle/>
+          <a:p>
+            <a:r>
+              <a:rPr lang="en-US" altLang="zh-CN" dirty="0">
+                <a:effectLst>
+                  <a:outerShdw blurRad="38100" dist="38100" dir="2700000" algn="tl">
+                    <a:srgbClr val="212121"/>
+                  </a:outerShdw>
+                </a:effectLst>
+                <a:latin typeface="Times New Roman"/>
+                <a:cs typeface="Times New Roman"/>
+              </a:rPr>
+              <a:t>Learned how to </a:t>
+            </a:r>
+            <a:r>
+              <a:rPr kumimoji="1" lang="en-US" altLang="zh-CN" sz="2000" b="1" dirty="0">
+                <a:solidFill>
+                  <a:srgbClr val="FF8000"/>
+                </a:solidFill>
+                <a:effectLst>
+                  <a:outerShdw blurRad="38100" dist="38100" dir="2700000" algn="tl">
+                    <a:srgbClr val="FFFFFF"/>
+                  </a:outerShdw>
+                </a:effectLst>
+                <a:latin typeface="Times New Roman"/>
+                <a:cs typeface="Times New Roman"/>
+              </a:rPr>
+              <a:t>submit jobs </a:t>
+            </a:r>
+            <a:r>
+              <a:rPr lang="en-US" altLang="zh-CN" dirty="0">
+                <a:effectLst>
+                  <a:outerShdw blurRad="38100" dist="38100" dir="2700000" algn="tl">
+                    <a:srgbClr val="212121"/>
+                  </a:outerShdw>
+                </a:effectLst>
+                <a:latin typeface="Times New Roman"/>
+                <a:cs typeface="Times New Roman"/>
+              </a:rPr>
+              <a:t>with Linux commands</a:t>
+            </a:r>
+          </a:p>
+          <a:p>
+            <a:r>
+              <a:rPr lang="en-US" altLang="zh-CN" dirty="0">
+                <a:effectLst>
+                  <a:outerShdw blurRad="38100" dist="38100" dir="2700000" algn="tl">
+                    <a:srgbClr val="212121"/>
+                  </a:outerShdw>
+                </a:effectLst>
+                <a:latin typeface="Times New Roman"/>
+                <a:cs typeface="Times New Roman"/>
+              </a:rPr>
+              <a:t>Installed R and R packages</a:t>
+            </a:r>
+          </a:p>
+          <a:p>
+            <a:r>
+              <a:rPr lang="en-US" altLang="zh-CN" dirty="0">
+                <a:effectLst>
+                  <a:outerShdw blurRad="38100" dist="38100" dir="2700000" algn="tl">
+                    <a:srgbClr val="212121"/>
+                  </a:outerShdw>
+                </a:effectLst>
+                <a:latin typeface="Times New Roman"/>
+                <a:cs typeface="Times New Roman"/>
+              </a:rPr>
+              <a:t>Learned CHTC server computing power</a:t>
+            </a:r>
+          </a:p>
+          <a:p>
+            <a:pPr lvl="1"/>
+            <a:r>
+              <a:rPr kumimoji="1" lang="en-US" altLang="zh-CN" b="1" dirty="0">
+                <a:solidFill>
+                  <a:srgbClr val="FF8000"/>
+                </a:solidFill>
+                <a:effectLst>
+                  <a:outerShdw blurRad="38100" dist="38100" dir="2700000" algn="tl">
+                    <a:srgbClr val="FFFFFF"/>
+                  </a:outerShdw>
+                </a:effectLst>
+                <a:latin typeface="Times New Roman"/>
+                <a:cs typeface="Times New Roman"/>
+              </a:rPr>
+              <a:t>More cores and more memories</a:t>
+            </a:r>
+          </a:p>
+          <a:p>
+            <a:pPr lvl="1"/>
+            <a:r>
+              <a:rPr kumimoji="1" lang="en-US" altLang="zh-CN" b="1" dirty="0">
+                <a:solidFill>
+                  <a:srgbClr val="FF8000"/>
+                </a:solidFill>
+                <a:effectLst>
+                  <a:outerShdw blurRad="38100" dist="38100" dir="2700000" algn="tl">
+                    <a:srgbClr val="FFFFFF"/>
+                  </a:outerShdw>
+                </a:effectLst>
+                <a:latin typeface="Times New Roman"/>
+                <a:cs typeface="Times New Roman"/>
+              </a:rPr>
+              <a:t>Parallel computing </a:t>
+            </a:r>
+            <a:r>
+              <a:rPr lang="en-US" altLang="zh-CN" dirty="0">
+                <a:effectLst>
+                  <a:outerShdw blurRad="38100" dist="38100" dir="2700000" algn="tl">
+                    <a:srgbClr val="212121"/>
+                  </a:outerShdw>
+                </a:effectLst>
+                <a:latin typeface="Times New Roman"/>
+                <a:cs typeface="Times New Roman"/>
+              </a:rPr>
+              <a:t>rather than a single fast core</a:t>
+            </a:r>
+          </a:p>
+          <a:p>
+            <a:r>
+              <a:rPr lang="en-US" altLang="zh-CN" dirty="0">
+                <a:effectLst>
+                  <a:outerShdw blurRad="38100" dist="38100" dir="2700000" algn="tl">
+                    <a:srgbClr val="212121"/>
+                  </a:outerShdw>
+                </a:effectLst>
+                <a:latin typeface="Times New Roman"/>
+                <a:cs typeface="Times New Roman"/>
+              </a:rPr>
+              <a:t>Performed the offline clean and recommender lab package on CHTC</a:t>
+            </a:r>
+          </a:p>
+        </p:txBody>
+      </p:sp>
+    </p:spTree>
+    <p:extLst>
+      <p:ext uri="{BB962C8B-B14F-4D97-AF65-F5344CB8AC3E}">
+        <p14:creationId xmlns:p14="http://schemas.microsoft.com/office/powerpoint/2010/main" val="1698282773"/>
+      </p:ext>
+    </p:extLst>
+  </p:cSld>
+  <p:clrMapOvr>
+    <a:masterClrMapping/>
+  </p:clrMapOvr>
+</p:sld>
+</file>
+
+<file path=ppt/slides/slide11.xml><?xml version="1.0" encoding="utf-8"?>
+<p:sld xmlns:a="http://schemas.openxmlformats.org/drawingml/2006/main" xmlns:r="http://schemas.openxmlformats.org/officeDocument/2006/relationships" xmlns:p="http://schemas.openxmlformats.org/presentationml/2006/main">
+  <p:cSld>
+    <p:spTree>
+      <p:nvGrpSpPr>
+        <p:cNvPr id="1" name=""/>
+        <p:cNvGrpSpPr/>
+        <p:nvPr/>
+      </p:nvGrpSpPr>
+      <p:grpSpPr>
+        <a:xfrm>
+          <a:off x="0" y="0"/>
+          <a:ext cx="0" cy="0"/>
+          <a:chOff x="0" y="0"/>
+          <a:chExt cx="0" cy="0"/>
+        </a:xfrm>
+      </p:grpSpPr>
+      <p:sp>
+        <p:nvSpPr>
+          <p:cNvPr id="2" name="Title 1"/>
+          <p:cNvSpPr>
+            <a:spLocks noGrp="1"/>
+          </p:cNvSpPr>
+          <p:nvPr>
+            <p:ph type="title"/>
+          </p:nvPr>
+        </p:nvSpPr>
+        <p:spPr/>
+        <p:txBody>
+          <a:bodyPr/>
+          <a:lstStyle/>
+          <a:p>
+            <a:r>
+              <a:rPr lang="en-US" altLang="zh-CN" sz="4300" dirty="0">
+                <a:effectLst>
+                  <a:outerShdw blurRad="38100" dist="38100" dir="2700000" algn="tl">
+                    <a:srgbClr val="212121"/>
+                  </a:outerShdw>
+                </a:effectLst>
+                <a:latin typeface="Times New Roman"/>
+                <a:cs typeface="Times New Roman"/>
+              </a:rPr>
+              <a:t>Scaling-up: from 100k to 20m</a:t>
+            </a:r>
+          </a:p>
+        </p:txBody>
+      </p:sp>
+      <p:sp>
+        <p:nvSpPr>
+          <p:cNvPr id="3" name="Content Placeholder 2"/>
+          <p:cNvSpPr>
+            <a:spLocks noGrp="1"/>
+          </p:cNvSpPr>
+          <p:nvPr>
+            <p:ph idx="1"/>
+          </p:nvPr>
+        </p:nvSpPr>
+        <p:spPr>
+          <a:xfrm>
+            <a:off x="685800" y="1868488"/>
+            <a:ext cx="7770813" cy="4257675"/>
+          </a:xfrm>
+        </p:spPr>
+        <p:txBody>
+          <a:bodyPr/>
+          <a:lstStyle/>
+          <a:p>
+            <a:r>
+              <a:rPr lang="en-US" altLang="zh-CN" dirty="0">
+                <a:effectLst>
+                  <a:outerShdw blurRad="38100" dist="38100" dir="2700000" algn="tl">
+                    <a:srgbClr val="212121"/>
+                  </a:outerShdw>
+                </a:effectLst>
+                <a:latin typeface="Times New Roman"/>
+                <a:cs typeface="Times New Roman"/>
+              </a:rPr>
+              <a:t>Challenging Parts</a:t>
+            </a:r>
+          </a:p>
+          <a:p>
+            <a:pPr lvl="1"/>
+            <a:r>
+              <a:rPr lang="en-US" altLang="zh-CN" dirty="0">
+                <a:effectLst>
+                  <a:outerShdw blurRad="38100" dist="38100" dir="2700000" algn="tl">
+                    <a:srgbClr val="212121"/>
+                  </a:outerShdw>
+                </a:effectLst>
+                <a:latin typeface="Times New Roman"/>
+                <a:cs typeface="Times New Roman"/>
+              </a:rPr>
+              <a:t>1. Dimension Change</a:t>
+            </a:r>
+          </a:p>
+          <a:p>
+            <a:pPr lvl="1"/>
+            <a:endParaRPr lang="en-US" altLang="zh-CN" dirty="0">
+              <a:effectLst>
+                <a:outerShdw blurRad="38100" dist="38100" dir="2700000" algn="tl">
+                  <a:srgbClr val="212121"/>
+                </a:outerShdw>
+              </a:effectLst>
+              <a:latin typeface="Times New Roman"/>
+              <a:cs typeface="Times New Roman"/>
+            </a:endParaRPr>
+          </a:p>
+          <a:p>
+            <a:pPr lvl="1"/>
+            <a:endParaRPr lang="en-US" altLang="zh-CN" dirty="0">
+              <a:effectLst>
+                <a:outerShdw blurRad="38100" dist="38100" dir="2700000" algn="tl">
+                  <a:srgbClr val="212121"/>
+                </a:outerShdw>
+              </a:effectLst>
+              <a:latin typeface="Times New Roman"/>
+              <a:cs typeface="Times New Roman"/>
+            </a:endParaRPr>
+          </a:p>
+          <a:p>
+            <a:pPr lvl="1"/>
+            <a:endParaRPr lang="en-US" altLang="zh-CN" dirty="0">
+              <a:effectLst>
+                <a:outerShdw blurRad="38100" dist="38100" dir="2700000" algn="tl">
+                  <a:srgbClr val="212121"/>
+                </a:outerShdw>
+              </a:effectLst>
+              <a:latin typeface="Times New Roman"/>
+              <a:cs typeface="Times New Roman"/>
+            </a:endParaRPr>
+          </a:p>
+          <a:p>
+            <a:pPr lvl="1"/>
+            <a:endParaRPr lang="en-US" altLang="zh-CN" dirty="0">
+              <a:effectLst>
+                <a:outerShdw blurRad="38100" dist="38100" dir="2700000" algn="tl">
+                  <a:srgbClr val="212121"/>
+                </a:outerShdw>
+              </a:effectLst>
+              <a:latin typeface="Times New Roman"/>
+              <a:cs typeface="Times New Roman"/>
+            </a:endParaRPr>
+          </a:p>
+          <a:p>
+            <a:pPr lvl="1"/>
+            <a:endParaRPr lang="en-US" altLang="zh-CN" dirty="0">
+              <a:effectLst>
+                <a:outerShdw blurRad="38100" dist="38100" dir="2700000" algn="tl">
+                  <a:srgbClr val="212121"/>
+                </a:outerShdw>
+              </a:effectLst>
+              <a:latin typeface="Times New Roman"/>
+              <a:cs typeface="Times New Roman"/>
+            </a:endParaRPr>
+          </a:p>
+          <a:p>
+            <a:pPr lvl="1"/>
+            <a:r>
+              <a:rPr lang="en-US" altLang="zh-CN" dirty="0">
+                <a:effectLst>
+                  <a:outerShdw blurRad="38100" dist="38100" dir="2700000" algn="tl">
+                    <a:srgbClr val="212121"/>
+                  </a:outerShdw>
+                </a:effectLst>
+                <a:latin typeface="Times New Roman"/>
+                <a:cs typeface="Times New Roman"/>
+              </a:rPr>
+              <a:t>2. Valid and reasonable methods to divide  </a:t>
+            </a:r>
+          </a:p>
+          <a:p>
+            <a:pPr lvl="1"/>
+            <a:r>
+              <a:rPr lang="en-US" altLang="zh-CN" dirty="0">
+                <a:effectLst>
+                  <a:outerShdw blurRad="38100" dist="38100" dir="2700000" algn="tl">
+                    <a:srgbClr val="212121"/>
+                  </a:outerShdw>
+                </a:effectLst>
+                <a:latin typeface="Times New Roman"/>
+                <a:cs typeface="Times New Roman"/>
+              </a:rPr>
+              <a:t>3. Coding for CHTC adaptation</a:t>
+            </a:r>
+          </a:p>
+        </p:txBody>
+      </p:sp>
+      <p:graphicFrame>
+        <p:nvGraphicFramePr>
+          <p:cNvPr id="4" name="Table 3"/>
+          <p:cNvGraphicFramePr>
+            <a:graphicFrameLocks noGrp="1"/>
+          </p:cNvGraphicFramePr>
+          <p:nvPr/>
+        </p:nvGraphicFramePr>
+        <p:xfrm>
+          <a:off x="1685925" y="2890838"/>
+          <a:ext cx="6096000" cy="1485900"/>
+        </p:xfrm>
+        <a:graphic>
+          <a:graphicData uri="http://schemas.openxmlformats.org/drawingml/2006/table">
+            <a:tbl>
+              <a:tblPr/>
+              <a:tblGrid>
+                <a:gridCol w="2032000"/>
+                <a:gridCol w="2032000"/>
+                <a:gridCol w="2032000"/>
+              </a:tblGrid>
+              <a:tr h="371475">
+                <a:tc>
+                  <a:txBody>
+                    <a:bodyPr/>
+                    <a:lstStyle/>
+                    <a:p>
+                      <a:pPr marL="0" marR="0" lvl="0" indent="0" algn="l" defTabSz="914400" rtl="0" eaLnBrk="1" fontAlgn="base" latinLnBrk="0" hangingPunct="1">
+                        <a:lnSpc>
+                          <a:spcPct val="100000"/>
+                        </a:lnSpc>
+                        <a:spcBef>
+                          <a:spcPct val="0"/>
+                        </a:spcBef>
+                        <a:spcAft>
+                          <a:spcPct val="0"/>
+                        </a:spcAft>
+                        <a:buClrTx/>
+                        <a:buSzTx/>
+                        <a:buFontTx/>
+                        <a:buNone/>
+                        <a:tabLst/>
+                      </a:pPr>
+                      <a:endParaRPr kumimoji="0" lang="zh-CN" altLang="en-US" sz="1800" b="1" i="0" u="none" strike="noStrike" cap="none" normalizeH="0" baseline="0">
+                        <a:ln>
+                          <a:noFill/>
+                        </a:ln>
+                        <a:solidFill>
+                          <a:srgbClr val="FFFFFF"/>
+                        </a:solidFill>
+                        <a:effectLst/>
+                        <a:latin typeface="Calisto MT" charset="0"/>
+                        <a:ea typeface="宋体" charset="0"/>
+                      </a:endParaRPr>
+                    </a:p>
+                  </a:txBody>
+                  <a:tcPr horzOverflow="overflow">
+                    <a:lnL w="12700" cap="flat" cmpd="sng" algn="ctr">
+                      <a:solidFill>
+                        <a:schemeClr val="tx1"/>
+                      </a:solidFill>
+                      <a:prstDash val="solid"/>
+                      <a:round/>
+                      <a:headEnd type="none" w="med" len="med"/>
+                      <a:tailEnd type="none" w="med" len="med"/>
+                    </a:lnL>
+                    <a:lnR w="12700" cap="flat" cmpd="sng" algn="ctr">
+                      <a:solidFill>
+                        <a:schemeClr val="tx1"/>
+                      </a:solidFill>
+                      <a:prstDash val="solid"/>
+                      <a:round/>
+                      <a:headEnd type="none" w="med" len="med"/>
+                      <a:tailEnd type="none" w="med" len="med"/>
+                    </a:lnR>
+                    <a:lnT w="12700" cap="flat" cmpd="sng" algn="ctr">
+                      <a:solidFill>
+                        <a:schemeClr val="tx1"/>
+                      </a:solidFill>
+                      <a:prstDash val="solid"/>
+                      <a:round/>
+                      <a:headEnd type="none" w="med" len="med"/>
+                      <a:tailEnd type="none" w="med" len="med"/>
+                    </a:lnT>
+                    <a:lnB w="38100" cap="flat" cmpd="sng" algn="ctr">
+                      <a:solidFill>
+                        <a:schemeClr val="tx1"/>
+                      </a:solidFill>
+                      <a:prstDash val="solid"/>
+                      <a:round/>
+                      <a:headEnd type="none" w="med" len="med"/>
+                      <a:tailEnd type="none" w="med" len="med"/>
+                    </a:lnB>
+                    <a:lnTlToBr>
+                      <a:noFill/>
+                    </a:lnTlToBr>
+                    <a:lnBlToTr>
+                      <a:noFill/>
+                    </a:lnBlToTr>
+                    <a:solidFill>
+                      <a:schemeClr val="accent1"/>
+                    </a:solidFill>
+                  </a:tcPr>
+                </a:tc>
+                <a:tc>
+                  <a:txBody>
+                    <a:bodyPr/>
+                    <a:lstStyle/>
+                    <a:p>
+                      <a:pPr marL="0" marR="0" lvl="0" indent="0" algn="l" defTabSz="914400" rtl="0" eaLnBrk="1" fontAlgn="base" latinLnBrk="0" hangingPunct="1">
+                        <a:lnSpc>
+                          <a:spcPct val="100000"/>
+                        </a:lnSpc>
+                        <a:spcBef>
+                          <a:spcPct val="0"/>
+                        </a:spcBef>
+                        <a:spcAft>
+                          <a:spcPct val="0"/>
+                        </a:spcAft>
+                        <a:buClrTx/>
+                        <a:buSzTx/>
+                        <a:buFontTx/>
+                        <a:buNone/>
+                        <a:tabLst/>
+                      </a:pPr>
+                      <a:r>
+                        <a:rPr kumimoji="0" lang="en-US" altLang="zh-CN" sz="1800" b="1" i="0" u="none" strike="noStrike" cap="none" normalizeH="0" baseline="0">
+                          <a:ln>
+                            <a:noFill/>
+                          </a:ln>
+                          <a:solidFill>
+                            <a:srgbClr val="FFFFFF"/>
+                          </a:solidFill>
+                          <a:effectLst/>
+                          <a:latin typeface="Calisto MT" charset="0"/>
+                          <a:ea typeface="宋体" charset="0"/>
+                        </a:rPr>
+                        <a:t>100k</a:t>
+                      </a:r>
+                    </a:p>
+                  </a:txBody>
+                  <a:tcPr horzOverflow="overflow">
+                    <a:lnL w="12700" cap="flat" cmpd="sng" algn="ctr">
+                      <a:solidFill>
+                        <a:schemeClr val="tx1"/>
+                      </a:solidFill>
+                      <a:prstDash val="solid"/>
+                      <a:round/>
+                      <a:headEnd type="none" w="med" len="med"/>
+                      <a:tailEnd type="none" w="med" len="med"/>
+                    </a:lnL>
+                    <a:lnR w="12700" cap="flat" cmpd="sng" algn="ctr">
+                      <a:solidFill>
+                        <a:schemeClr val="tx1"/>
+                      </a:solidFill>
+                      <a:prstDash val="solid"/>
+                      <a:round/>
+                      <a:headEnd type="none" w="med" len="med"/>
+                      <a:tailEnd type="none" w="med" len="med"/>
+                    </a:lnR>
+                    <a:lnT w="12700" cap="flat" cmpd="sng" algn="ctr">
+                      <a:solidFill>
+                        <a:schemeClr val="tx1"/>
+                      </a:solidFill>
+                      <a:prstDash val="solid"/>
+                      <a:round/>
+                      <a:headEnd type="none" w="med" len="med"/>
+                      <a:tailEnd type="none" w="med" len="med"/>
+                    </a:lnT>
+                    <a:lnB w="38100" cap="flat" cmpd="sng" algn="ctr">
+                      <a:solidFill>
+                        <a:schemeClr val="tx1"/>
+                      </a:solidFill>
+                      <a:prstDash val="solid"/>
+                      <a:round/>
+                      <a:headEnd type="none" w="med" len="med"/>
+                      <a:tailEnd type="none" w="med" len="med"/>
+                    </a:lnB>
+                    <a:lnTlToBr>
+                      <a:noFill/>
+                    </a:lnTlToBr>
+                    <a:lnBlToTr>
+                      <a:noFill/>
+                    </a:lnBlToTr>
+                    <a:solidFill>
+                      <a:schemeClr val="accent1"/>
+                    </a:solidFill>
+                  </a:tcPr>
+                </a:tc>
+                <a:tc>
+                  <a:txBody>
+                    <a:bodyPr/>
+                    <a:lstStyle/>
+                    <a:p>
+                      <a:pPr marL="0" marR="0" lvl="0" indent="0" algn="l" defTabSz="914400" rtl="0" eaLnBrk="1" fontAlgn="base" latinLnBrk="0" hangingPunct="1">
+                        <a:lnSpc>
+                          <a:spcPct val="100000"/>
+                        </a:lnSpc>
+                        <a:spcBef>
+                          <a:spcPct val="0"/>
+                        </a:spcBef>
+                        <a:spcAft>
+                          <a:spcPct val="0"/>
+                        </a:spcAft>
+                        <a:buClrTx/>
+                        <a:buSzTx/>
+                        <a:buFontTx/>
+                        <a:buNone/>
+                        <a:tabLst/>
+                      </a:pPr>
+                      <a:r>
+                        <a:rPr kumimoji="0" lang="en-US" altLang="zh-CN" sz="1800" b="1" i="0" u="none" strike="noStrike" cap="none" normalizeH="0" baseline="0">
+                          <a:ln>
+                            <a:noFill/>
+                          </a:ln>
+                          <a:solidFill>
+                            <a:srgbClr val="FFFFFF"/>
+                          </a:solidFill>
+                          <a:effectLst/>
+                          <a:latin typeface="Calisto MT" charset="0"/>
+                          <a:ea typeface="宋体" charset="0"/>
+                        </a:rPr>
+                        <a:t>20m</a:t>
+                      </a:r>
+                    </a:p>
+                  </a:txBody>
+                  <a:tcPr horzOverflow="overflow">
+                    <a:lnL w="12700" cap="flat" cmpd="sng" algn="ctr">
+                      <a:solidFill>
+                        <a:schemeClr val="tx1"/>
+                      </a:solidFill>
+                      <a:prstDash val="solid"/>
+                      <a:round/>
+                      <a:headEnd type="none" w="med" len="med"/>
+                      <a:tailEnd type="none" w="med" len="med"/>
+                    </a:lnL>
+                    <a:lnR w="12700" cap="flat" cmpd="sng" algn="ctr">
+                      <a:solidFill>
+                        <a:schemeClr val="tx1"/>
+                      </a:solidFill>
+                      <a:prstDash val="solid"/>
+                      <a:round/>
+                      <a:headEnd type="none" w="med" len="med"/>
+                      <a:tailEnd type="none" w="med" len="med"/>
+                    </a:lnR>
+                    <a:lnT w="12700" cap="flat" cmpd="sng" algn="ctr">
+                      <a:solidFill>
+                        <a:schemeClr val="tx1"/>
+                      </a:solidFill>
+                      <a:prstDash val="solid"/>
+                      <a:round/>
+                      <a:headEnd type="none" w="med" len="med"/>
+                      <a:tailEnd type="none" w="med" len="med"/>
+                    </a:lnT>
+                    <a:lnB w="38100" cap="flat" cmpd="sng" algn="ctr">
+                      <a:solidFill>
+                        <a:schemeClr val="tx1"/>
+                      </a:solidFill>
+                      <a:prstDash val="solid"/>
+                      <a:round/>
+                      <a:headEnd type="none" w="med" len="med"/>
+                      <a:tailEnd type="none" w="med" len="med"/>
+                    </a:lnB>
+                    <a:lnTlToBr>
+                      <a:noFill/>
+                    </a:lnTlToBr>
+                    <a:lnBlToTr>
+                      <a:noFill/>
+                    </a:lnBlToTr>
+                    <a:solidFill>
+                      <a:schemeClr val="accent1"/>
+                    </a:solidFill>
+                  </a:tcPr>
+                </a:tc>
+              </a:tr>
+              <a:tr h="371475">
+                <a:tc>
+                  <a:txBody>
+                    <a:bodyPr/>
+                    <a:lstStyle/>
+                    <a:p>
+                      <a:pPr marL="0" marR="0" lvl="0" indent="0" algn="l" defTabSz="914400" rtl="0" eaLnBrk="1" fontAlgn="base" latinLnBrk="0" hangingPunct="1">
+                        <a:lnSpc>
+                          <a:spcPct val="100000"/>
+                        </a:lnSpc>
+                        <a:spcBef>
+                          <a:spcPct val="0"/>
+                        </a:spcBef>
+                        <a:spcAft>
+                          <a:spcPct val="0"/>
+                        </a:spcAft>
+                        <a:buClrTx/>
+                        <a:buSzTx/>
+                        <a:buFontTx/>
+                        <a:buNone/>
+                        <a:tabLst/>
+                      </a:pPr>
+                      <a:r>
+                        <a:rPr kumimoji="0" lang="en-US" altLang="zh-CN" sz="1800" b="0" i="0" u="none" strike="noStrike" cap="none" normalizeH="0" baseline="0">
+                          <a:ln>
+                            <a:noFill/>
+                          </a:ln>
+                          <a:solidFill>
+                            <a:srgbClr val="000000"/>
+                          </a:solidFill>
+                          <a:effectLst/>
+                          <a:latin typeface="Calisto MT" charset="0"/>
+                          <a:ea typeface="宋体" charset="0"/>
+                        </a:rPr>
+                        <a:t>User Number</a:t>
+                      </a:r>
+                    </a:p>
+                  </a:txBody>
+                  <a:tcPr horzOverflow="overflow">
+                    <a:lnL w="12700" cap="flat" cmpd="sng" algn="ctr">
+                      <a:solidFill>
+                        <a:schemeClr val="tx1"/>
+                      </a:solidFill>
+                      <a:prstDash val="solid"/>
+                      <a:round/>
+                      <a:headEnd type="none" w="med" len="med"/>
+                      <a:tailEnd type="none" w="med" len="med"/>
+                    </a:lnL>
+                    <a:lnR w="12700" cap="flat" cmpd="sng" algn="ctr">
+                      <a:solidFill>
+                        <a:schemeClr val="tx1"/>
+                      </a:solidFill>
+                      <a:prstDash val="solid"/>
+                      <a:round/>
+                      <a:headEnd type="none" w="med" len="med"/>
+                      <a:tailEnd type="none" w="med" len="med"/>
+                    </a:lnR>
+                    <a:lnT w="38100" cap="flat" cmpd="sng" algn="ctr">
+                      <a:solidFill>
+                        <a:schemeClr val="tx1"/>
+                      </a:solidFill>
+                      <a:prstDash val="solid"/>
+                      <a:round/>
+                      <a:headEnd type="none" w="med" len="med"/>
+                      <a:tailEnd type="none" w="med" len="med"/>
+                    </a:lnT>
+                    <a:lnB w="12700" cap="flat" cmpd="sng" algn="ctr">
+                      <a:solidFill>
+                        <a:schemeClr val="tx1"/>
+                      </a:solidFill>
+                      <a:prstDash val="solid"/>
+                      <a:round/>
+                      <a:headEnd type="none" w="med" len="med"/>
+                      <a:tailEnd type="none" w="med" len="med"/>
+                    </a:lnB>
+                    <a:lnTlToBr>
+                      <a:noFill/>
+                    </a:lnTlToBr>
+                    <a:lnBlToTr>
+                      <a:noFill/>
+                    </a:lnBlToTr>
+                    <a:solidFill>
+                      <a:srgbClr val="CCD9ED"/>
+                    </a:solidFill>
+                  </a:tcPr>
+                </a:tc>
+                <a:tc>
+                  <a:txBody>
+                    <a:bodyPr/>
+                    <a:lstStyle/>
+                    <a:p>
+                      <a:pPr marL="0" marR="0" lvl="0" indent="0" algn="l" defTabSz="914400" rtl="0" eaLnBrk="1" fontAlgn="base" latinLnBrk="0" hangingPunct="1">
+                        <a:lnSpc>
+                          <a:spcPct val="100000"/>
+                        </a:lnSpc>
+                        <a:spcBef>
+                          <a:spcPct val="0"/>
+                        </a:spcBef>
+                        <a:spcAft>
+                          <a:spcPct val="0"/>
+                        </a:spcAft>
+                        <a:buClrTx/>
+                        <a:buSzTx/>
+                        <a:buFontTx/>
+                        <a:buNone/>
+                        <a:tabLst/>
+                      </a:pPr>
+                      <a:r>
+                        <a:rPr kumimoji="0" lang="cs-CZ" sz="1800" b="0" i="0" u="none" strike="noStrike" cap="none" normalizeH="0" baseline="0">
+                          <a:ln>
+                            <a:noFill/>
+                          </a:ln>
+                          <a:solidFill>
+                            <a:srgbClr val="000000"/>
+                          </a:solidFill>
+                          <a:effectLst/>
+                          <a:latin typeface="Calisto MT" charset="0"/>
+                          <a:ea typeface="宋体" charset="0"/>
+                        </a:rPr>
+                        <a:t>943</a:t>
+                      </a:r>
+                      <a:endParaRPr kumimoji="0" lang="en-US" altLang="zh-CN" sz="1800" b="0" i="0" u="none" strike="noStrike" cap="none" normalizeH="0" baseline="0">
+                        <a:ln>
+                          <a:noFill/>
+                        </a:ln>
+                        <a:solidFill>
+                          <a:srgbClr val="000000"/>
+                        </a:solidFill>
+                        <a:effectLst/>
+                        <a:latin typeface="Calisto MT" charset="0"/>
+                        <a:ea typeface="宋体" charset="0"/>
+                      </a:endParaRPr>
+                    </a:p>
+                  </a:txBody>
+                  <a:tcPr horzOverflow="overflow">
+                    <a:lnL w="12700" cap="flat" cmpd="sng" algn="ctr">
+                      <a:solidFill>
+                        <a:schemeClr val="tx1"/>
+                      </a:solidFill>
+                      <a:prstDash val="solid"/>
+                      <a:round/>
+                      <a:headEnd type="none" w="med" len="med"/>
+                      <a:tailEnd type="none" w="med" len="med"/>
+                    </a:lnL>
+                    <a:lnR w="12700" cap="flat" cmpd="sng" algn="ctr">
+                      <a:solidFill>
+                        <a:schemeClr val="tx1"/>
+                      </a:solidFill>
+                      <a:prstDash val="solid"/>
+                      <a:round/>
+                      <a:headEnd type="none" w="med" len="med"/>
+                      <a:tailEnd type="none" w="med" len="med"/>
+                    </a:lnR>
+                    <a:lnT w="38100" cap="flat" cmpd="sng" algn="ctr">
+                      <a:solidFill>
+                        <a:schemeClr val="tx1"/>
+                      </a:solidFill>
+                      <a:prstDash val="solid"/>
+                      <a:round/>
+                      <a:headEnd type="none" w="med" len="med"/>
+                      <a:tailEnd type="none" w="med" len="med"/>
+                    </a:lnT>
+                    <a:lnB w="12700" cap="flat" cmpd="sng" algn="ctr">
+                      <a:solidFill>
+                        <a:schemeClr val="tx1"/>
+                      </a:solidFill>
+                      <a:prstDash val="solid"/>
+                      <a:round/>
+                      <a:headEnd type="none" w="med" len="med"/>
+                      <a:tailEnd type="none" w="med" len="med"/>
+                    </a:lnB>
+                    <a:lnTlToBr>
+                      <a:noFill/>
+                    </a:lnTlToBr>
+                    <a:lnBlToTr>
+                      <a:noFill/>
+                    </a:lnBlToTr>
+                    <a:solidFill>
+                      <a:srgbClr val="CCD9ED"/>
+                    </a:solidFill>
+                  </a:tcPr>
+                </a:tc>
+                <a:tc>
+                  <a:txBody>
+                    <a:bodyPr/>
+                    <a:lstStyle/>
+                    <a:p>
+                      <a:pPr marL="0" marR="0" lvl="0" indent="0" algn="l" defTabSz="914400" rtl="0" eaLnBrk="1" fontAlgn="base" latinLnBrk="0" hangingPunct="1">
+                        <a:lnSpc>
+                          <a:spcPct val="100000"/>
+                        </a:lnSpc>
+                        <a:spcBef>
+                          <a:spcPct val="0"/>
+                        </a:spcBef>
+                        <a:spcAft>
+                          <a:spcPct val="0"/>
+                        </a:spcAft>
+                        <a:buClrTx/>
+                        <a:buSzTx/>
+                        <a:buFontTx/>
+                        <a:buNone/>
+                        <a:tabLst/>
+                      </a:pPr>
+                      <a:r>
+                        <a:rPr kumimoji="0" lang="is-IS" sz="1800" b="0" i="0" u="none" strike="noStrike" cap="none" normalizeH="0" baseline="0">
+                          <a:ln>
+                            <a:noFill/>
+                          </a:ln>
+                          <a:solidFill>
+                            <a:srgbClr val="000000"/>
+                          </a:solidFill>
+                          <a:effectLst/>
+                          <a:latin typeface="Calisto MT" charset="0"/>
+                          <a:ea typeface="宋体" charset="0"/>
+                        </a:rPr>
+                        <a:t>138,493</a:t>
+                      </a:r>
+                      <a:endParaRPr kumimoji="0" lang="en-US" altLang="zh-CN" sz="1800" b="0" i="0" u="none" strike="noStrike" cap="none" normalizeH="0" baseline="0">
+                        <a:ln>
+                          <a:noFill/>
+                        </a:ln>
+                        <a:solidFill>
+                          <a:srgbClr val="000000"/>
+                        </a:solidFill>
+                        <a:effectLst/>
+                        <a:latin typeface="Calisto MT" charset="0"/>
+                        <a:ea typeface="宋体" charset="0"/>
+                      </a:endParaRPr>
+                    </a:p>
+                  </a:txBody>
+                  <a:tcPr horzOverflow="overflow">
+                    <a:lnL w="12700" cap="flat" cmpd="sng" algn="ctr">
+                      <a:solidFill>
+                        <a:schemeClr val="tx1"/>
+                      </a:solidFill>
+                      <a:prstDash val="solid"/>
+                      <a:round/>
+                      <a:headEnd type="none" w="med" len="med"/>
+                      <a:tailEnd type="none" w="med" len="med"/>
+                    </a:lnL>
+                    <a:lnR w="12700" cap="flat" cmpd="sng" algn="ctr">
+                      <a:solidFill>
+                        <a:schemeClr val="tx1"/>
+                      </a:solidFill>
+                      <a:prstDash val="solid"/>
+                      <a:round/>
+                      <a:headEnd type="none" w="med" len="med"/>
+                      <a:tailEnd type="none" w="med" len="med"/>
+                    </a:lnR>
+                    <a:lnT w="38100" cap="flat" cmpd="sng" algn="ctr">
+                      <a:solidFill>
+                        <a:schemeClr val="tx1"/>
+                      </a:solidFill>
+                      <a:prstDash val="solid"/>
+                      <a:round/>
+                      <a:headEnd type="none" w="med" len="med"/>
+                      <a:tailEnd type="none" w="med" len="med"/>
+                    </a:lnT>
+                    <a:lnB w="12700" cap="flat" cmpd="sng" algn="ctr">
+                      <a:solidFill>
+                        <a:schemeClr val="tx1"/>
+                      </a:solidFill>
+                      <a:prstDash val="solid"/>
+                      <a:round/>
+                      <a:headEnd type="none" w="med" len="med"/>
+                      <a:tailEnd type="none" w="med" len="med"/>
+                    </a:lnB>
+                    <a:lnTlToBr>
+                      <a:noFill/>
+                    </a:lnTlToBr>
+                    <a:lnBlToTr>
+                      <a:noFill/>
+                    </a:lnBlToTr>
+                    <a:solidFill>
+                      <a:srgbClr val="CCD9ED"/>
+                    </a:solidFill>
+                  </a:tcPr>
+                </a:tc>
+              </a:tr>
+              <a:tr h="371475">
+                <a:tc>
+                  <a:txBody>
+                    <a:bodyPr/>
+                    <a:lstStyle/>
+                    <a:p>
+                      <a:pPr marL="0" marR="0" lvl="0" indent="0" algn="l" defTabSz="914400" rtl="0" eaLnBrk="1" fontAlgn="base" latinLnBrk="0" hangingPunct="1">
+                        <a:lnSpc>
+                          <a:spcPct val="100000"/>
+                        </a:lnSpc>
+                        <a:spcBef>
+                          <a:spcPct val="0"/>
+                        </a:spcBef>
+                        <a:spcAft>
+                          <a:spcPct val="0"/>
+                        </a:spcAft>
+                        <a:buClrTx/>
+                        <a:buSzTx/>
+                        <a:buFontTx/>
+                        <a:buNone/>
+                        <a:tabLst/>
+                      </a:pPr>
+                      <a:r>
+                        <a:rPr kumimoji="0" lang="en-US" altLang="zh-CN" sz="1800" b="0" i="0" u="none" strike="noStrike" cap="none" normalizeH="0" baseline="0">
+                          <a:ln>
+                            <a:noFill/>
+                          </a:ln>
+                          <a:solidFill>
+                            <a:srgbClr val="000000"/>
+                          </a:solidFill>
+                          <a:effectLst/>
+                          <a:latin typeface="Calisto MT" charset="0"/>
+                          <a:ea typeface="宋体" charset="0"/>
+                        </a:rPr>
+                        <a:t>Item Number</a:t>
+                      </a:r>
+                    </a:p>
+                  </a:txBody>
+                  <a:tcPr horzOverflow="overflow">
+                    <a:lnL w="12700" cap="flat" cmpd="sng" algn="ctr">
+                      <a:solidFill>
+                        <a:schemeClr val="tx1"/>
+                      </a:solidFill>
+                      <a:prstDash val="solid"/>
+                      <a:round/>
+                      <a:headEnd type="none" w="med" len="med"/>
+                      <a:tailEnd type="none" w="med" len="med"/>
+                    </a:lnL>
+                    <a:lnR w="12700" cap="flat" cmpd="sng" algn="ctr">
+                      <a:solidFill>
+                        <a:schemeClr val="tx1"/>
+                      </a:solidFill>
+                      <a:prstDash val="solid"/>
+                      <a:round/>
+                      <a:headEnd type="none" w="med" len="med"/>
+                      <a:tailEnd type="none" w="med" len="med"/>
+                    </a:lnR>
+                    <a:lnT w="12700" cap="flat" cmpd="sng" algn="ctr">
+                      <a:solidFill>
+                        <a:schemeClr val="tx1"/>
+                      </a:solidFill>
+                      <a:prstDash val="solid"/>
+                      <a:round/>
+                      <a:headEnd type="none" w="med" len="med"/>
+                      <a:tailEnd type="none" w="med" len="med"/>
+                    </a:lnT>
+                    <a:lnB w="12700" cap="flat" cmpd="sng" algn="ctr">
+                      <a:solidFill>
+                        <a:schemeClr val="tx1"/>
+                      </a:solidFill>
+                      <a:prstDash val="solid"/>
+                      <a:round/>
+                      <a:headEnd type="none" w="med" len="med"/>
+                      <a:tailEnd type="none" w="med" len="med"/>
+                    </a:lnB>
+                    <a:lnTlToBr>
+                      <a:noFill/>
+                    </a:lnTlToBr>
+                    <a:lnBlToTr>
+                      <a:noFill/>
+                    </a:lnBlToTr>
+                    <a:solidFill>
+                      <a:srgbClr val="E7EDF6"/>
+                    </a:solidFill>
+                  </a:tcPr>
+                </a:tc>
+                <a:tc>
+                  <a:txBody>
+                    <a:bodyPr/>
+                    <a:lstStyle/>
+                    <a:p>
+                      <a:pPr marL="0" marR="0" lvl="0" indent="0" algn="l" defTabSz="914400" rtl="0" eaLnBrk="1" fontAlgn="base" latinLnBrk="0" hangingPunct="1">
+                        <a:lnSpc>
+                          <a:spcPct val="100000"/>
+                        </a:lnSpc>
+                        <a:spcBef>
+                          <a:spcPct val="0"/>
+                        </a:spcBef>
+                        <a:spcAft>
+                          <a:spcPct val="0"/>
+                        </a:spcAft>
+                        <a:buClrTx/>
+                        <a:buSzTx/>
+                        <a:buFontTx/>
+                        <a:buNone/>
+                        <a:tabLst/>
+                      </a:pPr>
+                      <a:r>
+                        <a:rPr kumimoji="0" lang="is-IS" sz="1800" b="0" i="0" u="none" strike="noStrike" cap="none" normalizeH="0" baseline="0">
+                          <a:ln>
+                            <a:noFill/>
+                          </a:ln>
+                          <a:solidFill>
+                            <a:srgbClr val="000000"/>
+                          </a:solidFill>
+                          <a:effectLst/>
+                          <a:latin typeface="Calisto MT" charset="0"/>
+                          <a:ea typeface="宋体" charset="0"/>
+                        </a:rPr>
+                        <a:t>1,682</a:t>
+                      </a:r>
+                      <a:endParaRPr kumimoji="0" lang="en-US" altLang="zh-CN" sz="1800" b="0" i="0" u="none" strike="noStrike" cap="none" normalizeH="0" baseline="0">
+                        <a:ln>
+                          <a:noFill/>
+                        </a:ln>
+                        <a:solidFill>
+                          <a:srgbClr val="000000"/>
+                        </a:solidFill>
+                        <a:effectLst/>
+                        <a:latin typeface="Calisto MT" charset="0"/>
+                        <a:ea typeface="宋体" charset="0"/>
+                      </a:endParaRPr>
+                    </a:p>
+                  </a:txBody>
+                  <a:tcPr horzOverflow="overflow">
+                    <a:lnL w="12700" cap="flat" cmpd="sng" algn="ctr">
+                      <a:solidFill>
+                        <a:schemeClr val="tx1"/>
+                      </a:solidFill>
+                      <a:prstDash val="solid"/>
+                      <a:round/>
+                      <a:headEnd type="none" w="med" len="med"/>
+                      <a:tailEnd type="none" w="med" len="med"/>
+                    </a:lnL>
+                    <a:lnR w="12700" cap="flat" cmpd="sng" algn="ctr">
+                      <a:solidFill>
+                        <a:schemeClr val="tx1"/>
+                      </a:solidFill>
+                      <a:prstDash val="solid"/>
+                      <a:round/>
+                      <a:headEnd type="none" w="med" len="med"/>
+                      <a:tailEnd type="none" w="med" len="med"/>
+                    </a:lnR>
+                    <a:lnT w="12700" cap="flat" cmpd="sng" algn="ctr">
+                      <a:solidFill>
+                        <a:schemeClr val="tx1"/>
+                      </a:solidFill>
+                      <a:prstDash val="solid"/>
+                      <a:round/>
+                      <a:headEnd type="none" w="med" len="med"/>
+                      <a:tailEnd type="none" w="med" len="med"/>
+                    </a:lnT>
+                    <a:lnB w="12700" cap="flat" cmpd="sng" algn="ctr">
+                      <a:solidFill>
+                        <a:schemeClr val="tx1"/>
+                      </a:solidFill>
+                      <a:prstDash val="solid"/>
+                      <a:round/>
+                      <a:headEnd type="none" w="med" len="med"/>
+                      <a:tailEnd type="none" w="med" len="med"/>
+                    </a:lnB>
+                    <a:lnTlToBr>
+                      <a:noFill/>
+                    </a:lnTlToBr>
+                    <a:lnBlToTr>
+                      <a:noFill/>
+                    </a:lnBlToTr>
+                    <a:solidFill>
+                      <a:srgbClr val="E7EDF6"/>
+                    </a:solidFill>
+                  </a:tcPr>
+                </a:tc>
+                <a:tc>
+                  <a:txBody>
+                    <a:bodyPr/>
+                    <a:lstStyle/>
+                    <a:p>
+                      <a:pPr marL="0" marR="0" lvl="0" indent="0" algn="l" defTabSz="914400" rtl="0" eaLnBrk="1" fontAlgn="base" latinLnBrk="0" hangingPunct="1">
+                        <a:lnSpc>
+                          <a:spcPct val="100000"/>
+                        </a:lnSpc>
+                        <a:spcBef>
+                          <a:spcPct val="0"/>
+                        </a:spcBef>
+                        <a:spcAft>
+                          <a:spcPct val="0"/>
+                        </a:spcAft>
+                        <a:buClrTx/>
+                        <a:buSzTx/>
+                        <a:buFontTx/>
+                        <a:buNone/>
+                        <a:tabLst/>
+                      </a:pPr>
+                      <a:r>
+                        <a:rPr kumimoji="0" lang="is-IS" sz="1800" b="0" i="0" u="none" strike="noStrike" cap="none" normalizeH="0" baseline="0">
+                          <a:ln>
+                            <a:noFill/>
+                          </a:ln>
+                          <a:solidFill>
+                            <a:srgbClr val="000000"/>
+                          </a:solidFill>
+                          <a:effectLst/>
+                          <a:latin typeface="Calisto MT" charset="0"/>
+                          <a:ea typeface="宋体" charset="0"/>
+                        </a:rPr>
+                        <a:t>27,278</a:t>
+                      </a:r>
+                      <a:endParaRPr kumimoji="0" lang="en-US" altLang="zh-CN" sz="1800" b="0" i="0" u="none" strike="noStrike" cap="none" normalizeH="0" baseline="0">
+                        <a:ln>
+                          <a:noFill/>
+                        </a:ln>
+                        <a:solidFill>
+                          <a:srgbClr val="000000"/>
+                        </a:solidFill>
+                        <a:effectLst/>
+                        <a:latin typeface="Calisto MT" charset="0"/>
+                        <a:ea typeface="宋体" charset="0"/>
+                      </a:endParaRPr>
+                    </a:p>
+                  </a:txBody>
+                  <a:tcPr horzOverflow="overflow">
+                    <a:lnL w="12700" cap="flat" cmpd="sng" algn="ctr">
+                      <a:solidFill>
+                        <a:schemeClr val="tx1"/>
+                      </a:solidFill>
+                      <a:prstDash val="solid"/>
+                      <a:round/>
+                      <a:headEnd type="none" w="med" len="med"/>
+                      <a:tailEnd type="none" w="med" len="med"/>
+                    </a:lnL>
+                    <a:lnR w="12700" cap="flat" cmpd="sng" algn="ctr">
+                      <a:solidFill>
+                        <a:schemeClr val="tx1"/>
+                      </a:solidFill>
+                      <a:prstDash val="solid"/>
+                      <a:round/>
+                      <a:headEnd type="none" w="med" len="med"/>
+                      <a:tailEnd type="none" w="med" len="med"/>
+                    </a:lnR>
+                    <a:lnT w="12700" cap="flat" cmpd="sng" algn="ctr">
+                      <a:solidFill>
+                        <a:schemeClr val="tx1"/>
+                      </a:solidFill>
+                      <a:prstDash val="solid"/>
+                      <a:round/>
+                      <a:headEnd type="none" w="med" len="med"/>
+                      <a:tailEnd type="none" w="med" len="med"/>
+                    </a:lnT>
+                    <a:lnB w="12700" cap="flat" cmpd="sng" algn="ctr">
+                      <a:solidFill>
+                        <a:schemeClr val="tx1"/>
+                      </a:solidFill>
+                      <a:prstDash val="solid"/>
+                      <a:round/>
+                      <a:headEnd type="none" w="med" len="med"/>
+                      <a:tailEnd type="none" w="med" len="med"/>
+                    </a:lnB>
+                    <a:lnTlToBr>
+                      <a:noFill/>
+                    </a:lnTlToBr>
+                    <a:lnBlToTr>
+                      <a:noFill/>
+                    </a:lnBlToTr>
+                    <a:solidFill>
+                      <a:srgbClr val="E7EDF6"/>
+                    </a:solidFill>
+                  </a:tcPr>
+                </a:tc>
+              </a:tr>
+              <a:tr h="371475">
+                <a:tc>
+                  <a:txBody>
+                    <a:bodyPr/>
+                    <a:lstStyle/>
+                    <a:p>
+                      <a:pPr marL="0" marR="0" lvl="0" indent="0" algn="l" defTabSz="914400" rtl="0" eaLnBrk="1" fontAlgn="base" latinLnBrk="0" hangingPunct="1">
+                        <a:lnSpc>
+                          <a:spcPct val="100000"/>
+                        </a:lnSpc>
+                        <a:spcBef>
+                          <a:spcPct val="0"/>
+                        </a:spcBef>
+                        <a:spcAft>
+                          <a:spcPct val="0"/>
+                        </a:spcAft>
+                        <a:buClrTx/>
+                        <a:buSzTx/>
+                        <a:buFontTx/>
+                        <a:buNone/>
+                        <a:tabLst/>
+                      </a:pPr>
+                      <a:r>
+                        <a:rPr kumimoji="0" lang="en-US" altLang="zh-CN" sz="1800" b="0" i="0" u="none" strike="noStrike" cap="none" normalizeH="0" baseline="0">
+                          <a:ln>
+                            <a:noFill/>
+                          </a:ln>
+                          <a:solidFill>
+                            <a:srgbClr val="000000"/>
+                          </a:solidFill>
+                          <a:effectLst/>
+                          <a:latin typeface="Calisto MT" charset="0"/>
+                          <a:ea typeface="宋体" charset="0"/>
+                        </a:rPr>
+                        <a:t>Ratings</a:t>
+                      </a:r>
+                    </a:p>
+                  </a:txBody>
+                  <a:tcPr horzOverflow="overflow">
+                    <a:lnL w="12700" cap="flat" cmpd="sng" algn="ctr">
+                      <a:solidFill>
+                        <a:schemeClr val="tx1"/>
+                      </a:solidFill>
+                      <a:prstDash val="solid"/>
+                      <a:round/>
+                      <a:headEnd type="none" w="med" len="med"/>
+                      <a:tailEnd type="none" w="med" len="med"/>
+                    </a:lnL>
+                    <a:lnR w="12700" cap="flat" cmpd="sng" algn="ctr">
+                      <a:solidFill>
+                        <a:schemeClr val="tx1"/>
+                      </a:solidFill>
+                      <a:prstDash val="solid"/>
+                      <a:round/>
+                      <a:headEnd type="none" w="med" len="med"/>
+                      <a:tailEnd type="none" w="med" len="med"/>
+                    </a:lnR>
+                    <a:lnT w="12700" cap="flat" cmpd="sng" algn="ctr">
+                      <a:solidFill>
+                        <a:schemeClr val="tx1"/>
+                      </a:solidFill>
+                      <a:prstDash val="solid"/>
+                      <a:round/>
+                      <a:headEnd type="none" w="med" len="med"/>
+                      <a:tailEnd type="none" w="med" len="med"/>
+                    </a:lnT>
+                    <a:lnB w="12700" cap="flat" cmpd="sng" algn="ctr">
+                      <a:solidFill>
+                        <a:schemeClr val="tx1"/>
+                      </a:solidFill>
+                      <a:prstDash val="solid"/>
+                      <a:round/>
+                      <a:headEnd type="none" w="med" len="med"/>
+                      <a:tailEnd type="none" w="med" len="med"/>
+                    </a:lnB>
+                    <a:lnTlToBr>
+                      <a:noFill/>
+                    </a:lnTlToBr>
+                    <a:lnBlToTr>
+                      <a:noFill/>
+                    </a:lnBlToTr>
+                    <a:solidFill>
+                      <a:srgbClr val="CCD9ED"/>
+                    </a:solidFill>
+                  </a:tcPr>
+                </a:tc>
+                <a:tc>
+                  <a:txBody>
+                    <a:bodyPr/>
+                    <a:lstStyle/>
+                    <a:p>
+                      <a:pPr marL="0" marR="0" lvl="0" indent="0" algn="l" defTabSz="914400" rtl="0" eaLnBrk="1" fontAlgn="base" latinLnBrk="0" hangingPunct="1">
+                        <a:lnSpc>
+                          <a:spcPct val="100000"/>
+                        </a:lnSpc>
+                        <a:spcBef>
+                          <a:spcPct val="0"/>
+                        </a:spcBef>
+                        <a:spcAft>
+                          <a:spcPct val="0"/>
+                        </a:spcAft>
+                        <a:buClrTx/>
+                        <a:buSzTx/>
+                        <a:buFontTx/>
+                        <a:buNone/>
+                        <a:tabLst/>
+                      </a:pPr>
+                      <a:r>
+                        <a:rPr kumimoji="0" lang="en-US" altLang="zh-CN" sz="1800" b="0" i="0" u="none" strike="noStrike" cap="none" normalizeH="0" baseline="0">
+                          <a:ln>
+                            <a:noFill/>
+                          </a:ln>
+                          <a:solidFill>
+                            <a:srgbClr val="000000"/>
+                          </a:solidFill>
+                          <a:effectLst/>
+                          <a:latin typeface="Calisto MT" charset="0"/>
+                          <a:ea typeface="宋体" charset="0"/>
+                        </a:rPr>
+                        <a:t>100,000</a:t>
+                      </a:r>
+                    </a:p>
+                  </a:txBody>
+                  <a:tcPr horzOverflow="overflow">
+                    <a:lnL w="12700" cap="flat" cmpd="sng" algn="ctr">
+                      <a:solidFill>
+                        <a:schemeClr val="tx1"/>
+                      </a:solidFill>
+                      <a:prstDash val="solid"/>
+                      <a:round/>
+                      <a:headEnd type="none" w="med" len="med"/>
+                      <a:tailEnd type="none" w="med" len="med"/>
+                    </a:lnL>
+                    <a:lnR w="12700" cap="flat" cmpd="sng" algn="ctr">
+                      <a:solidFill>
+                        <a:schemeClr val="tx1"/>
+                      </a:solidFill>
+                      <a:prstDash val="solid"/>
+                      <a:round/>
+                      <a:headEnd type="none" w="med" len="med"/>
+                      <a:tailEnd type="none" w="med" len="med"/>
+                    </a:lnR>
+                    <a:lnT w="12700" cap="flat" cmpd="sng" algn="ctr">
+                      <a:solidFill>
+                        <a:schemeClr val="tx1"/>
+                      </a:solidFill>
+                      <a:prstDash val="solid"/>
+                      <a:round/>
+                      <a:headEnd type="none" w="med" len="med"/>
+                      <a:tailEnd type="none" w="med" len="med"/>
+                    </a:lnT>
+                    <a:lnB w="12700" cap="flat" cmpd="sng" algn="ctr">
+                      <a:solidFill>
+                        <a:schemeClr val="tx1"/>
+                      </a:solidFill>
+                      <a:prstDash val="solid"/>
+                      <a:round/>
+                      <a:headEnd type="none" w="med" len="med"/>
+                      <a:tailEnd type="none" w="med" len="med"/>
+                    </a:lnB>
+                    <a:lnTlToBr>
+                      <a:noFill/>
+                    </a:lnTlToBr>
+                    <a:lnBlToTr>
+                      <a:noFill/>
+                    </a:lnBlToTr>
+                    <a:solidFill>
+                      <a:srgbClr val="CCD9ED"/>
+                    </a:solidFill>
+                  </a:tcPr>
+                </a:tc>
+                <a:tc>
+                  <a:txBody>
+                    <a:bodyPr/>
+                    <a:lstStyle/>
+                    <a:p>
+                      <a:pPr marL="0" marR="0" lvl="0" indent="0" algn="l" defTabSz="914400" rtl="0" eaLnBrk="1" fontAlgn="base" latinLnBrk="0" hangingPunct="1">
+                        <a:lnSpc>
+                          <a:spcPct val="100000"/>
+                        </a:lnSpc>
+                        <a:spcBef>
+                          <a:spcPct val="0"/>
+                        </a:spcBef>
+                        <a:spcAft>
+                          <a:spcPct val="0"/>
+                        </a:spcAft>
+                        <a:buClrTx/>
+                        <a:buSzTx/>
+                        <a:buFontTx/>
+                        <a:buNone/>
+                        <a:tabLst/>
+                      </a:pPr>
+                      <a:r>
+                        <a:rPr kumimoji="0" lang="en-US" altLang="zh-CN" sz="1800" b="0" i="0" u="none" strike="noStrike" cap="none" normalizeH="0" baseline="0">
+                          <a:ln>
+                            <a:noFill/>
+                          </a:ln>
+                          <a:solidFill>
+                            <a:srgbClr val="000000"/>
+                          </a:solidFill>
+                          <a:effectLst/>
+                          <a:latin typeface="Calisto MT" charset="0"/>
+                          <a:ea typeface="宋体" charset="0"/>
+                        </a:rPr>
+                        <a:t>20,000,263</a:t>
+                      </a:r>
+                    </a:p>
+                  </a:txBody>
+                  <a:tcPr horzOverflow="overflow">
+                    <a:lnL w="12700" cap="flat" cmpd="sng" algn="ctr">
+                      <a:solidFill>
+                        <a:schemeClr val="tx1"/>
+                      </a:solidFill>
+                      <a:prstDash val="solid"/>
+                      <a:round/>
+                      <a:headEnd type="none" w="med" len="med"/>
+                      <a:tailEnd type="none" w="med" len="med"/>
+                    </a:lnL>
+                    <a:lnR w="12700" cap="flat" cmpd="sng" algn="ctr">
+                      <a:solidFill>
+                        <a:schemeClr val="tx1"/>
+                      </a:solidFill>
+                      <a:prstDash val="solid"/>
+                      <a:round/>
+                      <a:headEnd type="none" w="med" len="med"/>
+                      <a:tailEnd type="none" w="med" len="med"/>
+                    </a:lnR>
+                    <a:lnT w="12700" cap="flat" cmpd="sng" algn="ctr">
+                      <a:solidFill>
+                        <a:schemeClr val="tx1"/>
+                      </a:solidFill>
+                      <a:prstDash val="solid"/>
+                      <a:round/>
+                      <a:headEnd type="none" w="med" len="med"/>
+                      <a:tailEnd type="none" w="med" len="med"/>
+                    </a:lnT>
+                    <a:lnB w="12700" cap="flat" cmpd="sng" algn="ctr">
+                      <a:solidFill>
+                        <a:schemeClr val="tx1"/>
+                      </a:solidFill>
+                      <a:prstDash val="solid"/>
+                      <a:round/>
+                      <a:headEnd type="none" w="med" len="med"/>
+                      <a:tailEnd type="none" w="med" len="med"/>
+                    </a:lnB>
+                    <a:lnTlToBr>
+                      <a:noFill/>
+                    </a:lnTlToBr>
+                    <a:lnBlToTr>
+                      <a:noFill/>
+                    </a:lnBlToTr>
+                    <a:solidFill>
+                      <a:srgbClr val="CCD9ED"/>
+                    </a:solidFill>
+                  </a:tcPr>
+                </a:tc>
+              </a:tr>
+            </a:tbl>
+          </a:graphicData>
+        </a:graphic>
+      </p:graphicFrame>
+    </p:spTree>
+    <p:extLst>
+      <p:ext uri="{BB962C8B-B14F-4D97-AF65-F5344CB8AC3E}">
+        <p14:creationId xmlns:p14="http://schemas.microsoft.com/office/powerpoint/2010/main" val="2922776996"/>
+      </p:ext>
+    </p:extLst>
+  </p:cSld>
+  <p:clrMapOvr>
+    <a:masterClrMapping/>
+  </p:clrMapOvr>
+</p:sld>
+</file>
+
+<file path=ppt/slides/slide12.xml><?xml version="1.0" encoding="utf-8"?>
+<p:sld xmlns:a="http://schemas.openxmlformats.org/drawingml/2006/main" xmlns:r="http://schemas.openxmlformats.org/officeDocument/2006/relationships" xmlns:p="http://schemas.openxmlformats.org/presentationml/2006/main">
+  <p:cSld>
+    <p:spTree>
+      <p:nvGrpSpPr>
+        <p:cNvPr id="1" name=""/>
+        <p:cNvGrpSpPr/>
+        <p:nvPr/>
+      </p:nvGrpSpPr>
+      <p:grpSpPr>
+        <a:xfrm>
+          <a:off x="0" y="0"/>
+          <a:ext cx="0" cy="0"/>
+          <a:chOff x="0" y="0"/>
+          <a:chExt cx="0" cy="0"/>
+        </a:xfrm>
+      </p:grpSpPr>
+      <p:sp>
+        <p:nvSpPr>
+          <p:cNvPr id="2" name="Title 1"/>
+          <p:cNvSpPr>
+            <a:spLocks noGrp="1"/>
+          </p:cNvSpPr>
+          <p:nvPr>
+            <p:ph type="title"/>
+          </p:nvPr>
+        </p:nvSpPr>
+        <p:spPr/>
+        <p:txBody>
+          <a:bodyPr/>
+          <a:lstStyle/>
+          <a:p>
+            <a:r>
+              <a:rPr lang="en-US" altLang="zh-CN" dirty="0">
+                <a:effectLst>
+                  <a:outerShdw blurRad="38100" dist="38100" dir="2700000" algn="tl">
+                    <a:srgbClr val="212121"/>
+                  </a:outerShdw>
+                </a:effectLst>
+                <a:latin typeface="Calisto MT" charset="0"/>
+              </a:rPr>
+              <a:t>What we have done so far?</a:t>
+            </a:r>
+          </a:p>
+        </p:txBody>
+      </p:sp>
+      <p:sp>
+        <p:nvSpPr>
+          <p:cNvPr id="3" name="Content Placeholder 2"/>
+          <p:cNvSpPr>
+            <a:spLocks noGrp="1"/>
+          </p:cNvSpPr>
+          <p:nvPr>
+            <p:ph idx="1"/>
+          </p:nvPr>
+        </p:nvSpPr>
+        <p:spPr>
+          <a:xfrm>
+            <a:off x="685800" y="1868488"/>
+            <a:ext cx="7770813" cy="4257675"/>
+          </a:xfrm>
+        </p:spPr>
+        <p:txBody>
+          <a:bodyPr/>
+          <a:lstStyle/>
+          <a:p>
+            <a:r>
+              <a:rPr lang="en-US" altLang="zh-CN">
+                <a:effectLst>
+                  <a:outerShdw blurRad="38100" dist="38100" dir="2700000" algn="tl">
+                    <a:srgbClr val="212121"/>
+                  </a:outerShdw>
+                </a:effectLst>
+                <a:latin typeface="Times New Roman"/>
+                <a:cs typeface="Times New Roman"/>
+              </a:rPr>
+              <a:t>Finished bridging offline works with CHTC servers</a:t>
+            </a:r>
+          </a:p>
+          <a:p>
+            <a:r>
+              <a:rPr lang="en-US" altLang="zh-CN">
+                <a:effectLst>
+                  <a:outerShdw blurRad="38100" dist="38100" dir="2700000" algn="tl">
+                    <a:srgbClr val="212121"/>
+                  </a:outerShdw>
+                </a:effectLst>
+                <a:latin typeface="Times New Roman"/>
+                <a:cs typeface="Times New Roman"/>
+              </a:rPr>
+              <a:t>Data Cleaning</a:t>
+            </a:r>
+          </a:p>
+          <a:p>
+            <a:pPr lvl="2"/>
+            <a:r>
+              <a:rPr lang="en-US" altLang="zh-CN">
+                <a:effectLst>
+                  <a:outerShdw blurRad="38100" dist="38100" dir="2700000" algn="tl">
+                    <a:srgbClr val="212121"/>
+                  </a:outerShdw>
+                </a:effectLst>
+                <a:latin typeface="Times New Roman"/>
+                <a:cs typeface="Times New Roman"/>
+              </a:rPr>
+              <a:t>Wrote code for building a giant rating matrix</a:t>
+            </a:r>
+          </a:p>
+          <a:p>
+            <a:pPr lvl="2"/>
+            <a:r>
+              <a:rPr lang="en-US" altLang="zh-CN">
+                <a:effectLst>
+                  <a:outerShdw blurRad="38100" dist="38100" dir="2700000" algn="tl">
+                    <a:srgbClr val="212121"/>
+                  </a:outerShdw>
+                </a:effectLst>
+                <a:latin typeface="Times New Roman"/>
+                <a:cs typeface="Times New Roman"/>
+              </a:rPr>
+              <a:t>Had our recommender lab code prepared and adapted for CHTC</a:t>
+            </a:r>
+          </a:p>
+          <a:p>
+            <a:r>
+              <a:rPr lang="en-US" altLang="zh-CN">
+                <a:effectLst>
+                  <a:outerShdw blurRad="38100" dist="38100" dir="2700000" algn="tl">
+                    <a:srgbClr val="212121"/>
+                  </a:outerShdw>
+                </a:effectLst>
+                <a:latin typeface="Times New Roman"/>
+                <a:cs typeface="Times New Roman"/>
+              </a:rPr>
+              <a:t>Used random selection of users and movies and try on the method</a:t>
+            </a:r>
+          </a:p>
+          <a:p>
+            <a:r>
+              <a:rPr lang="en-US" altLang="zh-CN">
+                <a:effectLst>
+                  <a:outerShdw blurRad="38100" dist="38100" dir="2700000" algn="tl">
+                    <a:srgbClr val="212121"/>
+                  </a:outerShdw>
+                </a:effectLst>
+                <a:latin typeface="Times New Roman"/>
+                <a:cs typeface="Times New Roman"/>
+              </a:rPr>
+              <a:t>We are actively seeking valid methods to divide and slice the total dataset into pieces in order to improve prediction accuracy.</a:t>
+            </a:r>
+          </a:p>
+        </p:txBody>
+      </p:sp>
+    </p:spTree>
+    <p:extLst>
+      <p:ext uri="{BB962C8B-B14F-4D97-AF65-F5344CB8AC3E}">
+        <p14:creationId xmlns:p14="http://schemas.microsoft.com/office/powerpoint/2010/main" val="766201828"/>
+      </p:ext>
+    </p:extLst>
+  </p:cSld>
+  <p:clrMapOvr>
+    <a:masterClrMapping/>
+  </p:clrMapOvr>
+</p:sld>
+</file>
+
+<file path=ppt/slides/slide13.xml><?xml version="1.0" encoding="utf-8"?>
+<p:sld xmlns:a="http://schemas.openxmlformats.org/drawingml/2006/main" xmlns:r="http://schemas.openxmlformats.org/officeDocument/2006/relationships" xmlns:p="http://schemas.openxmlformats.org/presentationml/2006/main">
+  <p:cSld>
+    <p:spTree>
+      <p:nvGrpSpPr>
+        <p:cNvPr id="1" name=""/>
+        <p:cNvGrpSpPr/>
+        <p:nvPr/>
+      </p:nvGrpSpPr>
+      <p:grpSpPr>
+        <a:xfrm>
+          <a:off x="0" y="0"/>
+          <a:ext cx="0" cy="0"/>
+          <a:chOff x="0" y="0"/>
+          <a:chExt cx="0" cy="0"/>
+        </a:xfrm>
+      </p:grpSpPr>
+      <p:sp>
+        <p:nvSpPr>
+          <p:cNvPr id="2" name="Title 1"/>
+          <p:cNvSpPr>
+            <a:spLocks noGrp="1"/>
+          </p:cNvSpPr>
+          <p:nvPr>
+            <p:ph type="title"/>
+          </p:nvPr>
+        </p:nvSpPr>
+        <p:spPr/>
+        <p:txBody>
+          <a:bodyPr/>
+          <a:lstStyle/>
+          <a:p>
+            <a:r>
+              <a:rPr lang="en-US" altLang="zh-CN" dirty="0">
+                <a:effectLst>
+                  <a:outerShdw blurRad="38100" dist="38100" dir="2700000" algn="tl">
+                    <a:srgbClr val="212121"/>
+                  </a:outerShdw>
+                </a:effectLst>
+                <a:latin typeface="Times New Roman"/>
+                <a:cs typeface="Times New Roman"/>
+              </a:rPr>
+              <a:t>What</a:t>
+            </a:r>
+            <a:r>
+              <a:rPr lang="en-US" altLang="zh-CN" dirty="0">
+                <a:effectLst>
+                  <a:outerShdw blurRad="38100" dist="38100" dir="2700000" algn="tl">
+                    <a:srgbClr val="212121"/>
+                  </a:outerShdw>
+                </a:effectLst>
+                <a:latin typeface="Calisto MT" charset="0"/>
+              </a:rPr>
+              <a:t> we are going to do?</a:t>
+            </a:r>
+          </a:p>
+        </p:txBody>
+      </p:sp>
+      <p:sp>
+        <p:nvSpPr>
+          <p:cNvPr id="3" name="Content Placeholder 2"/>
+          <p:cNvSpPr>
+            <a:spLocks noGrp="1"/>
+          </p:cNvSpPr>
+          <p:nvPr>
+            <p:ph idx="1"/>
+          </p:nvPr>
+        </p:nvSpPr>
+        <p:spPr>
+          <a:xfrm>
+            <a:off x="685800" y="1868488"/>
+            <a:ext cx="7770813" cy="4257675"/>
+          </a:xfrm>
+        </p:spPr>
+        <p:txBody>
+          <a:bodyPr/>
+          <a:lstStyle/>
+          <a:p>
+            <a:r>
+              <a:rPr lang="en-US" altLang="zh-CN" dirty="0">
+                <a:effectLst>
+                  <a:outerShdw blurRad="38100" dist="38100" dir="2700000" algn="tl">
+                    <a:srgbClr val="212121"/>
+                  </a:outerShdw>
+                </a:effectLst>
+                <a:latin typeface="Times New Roman"/>
+                <a:cs typeface="Times New Roman"/>
+              </a:rPr>
+              <a:t>Finishing up methods in dividing</a:t>
+            </a:r>
+          </a:p>
+          <a:p>
+            <a:r>
+              <a:rPr lang="en-US" altLang="zh-CN" dirty="0">
+                <a:effectLst>
+                  <a:outerShdw blurRad="38100" dist="38100" dir="2700000" algn="tl">
+                    <a:srgbClr val="212121"/>
+                  </a:outerShdw>
+                </a:effectLst>
+                <a:latin typeface="Times New Roman"/>
+                <a:cs typeface="Times New Roman"/>
+              </a:rPr>
+              <a:t>Focus on accuracy </a:t>
+            </a:r>
+          </a:p>
+        </p:txBody>
+      </p:sp>
+    </p:spTree>
+    <p:extLst>
+      <p:ext uri="{BB962C8B-B14F-4D97-AF65-F5344CB8AC3E}">
+        <p14:creationId xmlns:p14="http://schemas.microsoft.com/office/powerpoint/2010/main" val="2558133793"/>
+      </p:ext>
+    </p:extLst>
+  </p:cSld>
+  <p:clrMapOvr>
+    <a:masterClrMapping/>
+  </p:clrMapOvr>
+</p:sld>
+</file>
+
+<file path=ppt/slides/slide14.xml><?xml version="1.0" encoding="utf-8"?>
+<p:sld xmlns:a="http://schemas.openxmlformats.org/drawingml/2006/main" xmlns:r="http://schemas.openxmlformats.org/officeDocument/2006/relationships" xmlns:p="http://schemas.openxmlformats.org/presentationml/2006/main">
+  <p:cSld>
+    <p:spTree>
+      <p:nvGrpSpPr>
+        <p:cNvPr id="1" name=""/>
+        <p:cNvGrpSpPr/>
+        <p:nvPr/>
+      </p:nvGrpSpPr>
+      <p:grpSpPr>
+        <a:xfrm>
+          <a:off x="0" y="0"/>
+          <a:ext cx="0" cy="0"/>
+          <a:chOff x="0" y="0"/>
+          <a:chExt cx="0" cy="0"/>
+        </a:xfrm>
+      </p:grpSpPr>
+      <p:sp>
+        <p:nvSpPr>
           <p:cNvPr id="3" name="内容占位符 2"/>
           <p:cNvSpPr>
             <a:spLocks noGrp="1"/>
@@ -9949,7 +11745,7 @@
     </p:spTree>
     <p:extLst>
       <p:ext uri="{BB962C8B-B14F-4D97-AF65-F5344CB8AC3E}">
-        <p14:creationId xmlns:p14="http://schemas.microsoft.com/office/powerpoint/2010/main" val="2990586079"/>
+        <p14:creationId xmlns:p14="http://schemas.microsoft.com/office/powerpoint/2010/main" val="3838679575"/>
       </p:ext>
     </p:extLst>
   </p:cSld>
@@ -12606,11 +14402,7 @@
           <a:p>
             <a:r>
               <a:rPr kumimoji="1" lang="en-US" altLang="zh-CN" dirty="0" smtClean="0"/>
-              <a:t>8-13	  14-16	       17-19         </a:t>
-            </a:r>
-            <a:r>
-              <a:rPr kumimoji="1" lang="en-US" altLang="zh-CN" dirty="0" smtClean="0"/>
-              <a:t>20</a:t>
+              <a:t>8-13	  14-16	       17-19         20</a:t>
             </a:r>
             <a:r>
               <a:rPr kumimoji="1" lang="en-US" altLang="zh-CN" dirty="0"/>
@@ -12618,11 +14410,7 @@
             </a:r>
             <a:r>
               <a:rPr kumimoji="1" lang="en-US" altLang="zh-CN" dirty="0" smtClean="0"/>
-              <a:t>25           </a:t>
-            </a:r>
-            <a:r>
-              <a:rPr kumimoji="1" lang="en-US" altLang="zh-CN" dirty="0" smtClean="0"/>
-              <a:t>26-35   	      36-45	            46-50</a:t>
+              <a:t>25           26-35   	      36-45	            46-50</a:t>
             </a:r>
             <a:endParaRPr kumimoji="1" lang="zh-CN" altLang="en-US" dirty="0"/>
           </a:p>

</xml_diff>